<commit_message>
Ajuste mapa tema 13
Ajuste mapa tema 13
</commit_message>
<xml_diff>
--- a/fuentes/contenidos/grado06/guion13/MA_06_13_Mapa_Conceptual.pptx
+++ b/fuentes/contenidos/grado06/guion13/MA_06_13_Mapa_Conceptual.pptx
@@ -106,7 +106,7 @@
   </p:defaultTextStyle>
   <p:extLst>
     <p:ext uri="{EFAFB233-063F-42B5-8137-9DF3F51BA10A}">
-      <p15:sldGuideLst xmlns="" xmlns:p15="http://schemas.microsoft.com/office/powerpoint/2012/main"/>
+      <p15:sldGuideLst xmlns:p15="http://schemas.microsoft.com/office/powerpoint/2012/main" xmlns=""/>
     </p:ext>
   </p:extLst>
 </p:presentation>
@@ -132,7 +132,7 @@
     </p:spTree>
     <p:extLst>
       <p:ext uri="{BB962C8B-B14F-4D97-AF65-F5344CB8AC3E}">
-        <p14:creationId xmlns:p14="http://schemas.microsoft.com/office/powerpoint/2010/main" xmlns="" val="2000257042"/>
+        <p14:creationId xmlns:p14="http://schemas.microsoft.com/office/powerpoint/2010/main" val="2000257042"/>
       </p:ext>
     </p:extLst>
   </p:cSld>
@@ -142,7 +142,7 @@
   <p:timing>
     <p:tnLst>
       <p:par>
-        <p:cTn id="1" dur="indefinite" restart="never" nodeType="tmRoot"/>
+        <p:cTn xmlns:p14="http://schemas.microsoft.com/office/powerpoint/2010/main" id="1" dur="indefinite" restart="never" nodeType="tmRoot"/>
       </p:par>
     </p:tnLst>
   </p:timing>
@@ -169,7 +169,7 @@
     </p:spTree>
     <p:extLst>
       <p:ext uri="{BB962C8B-B14F-4D97-AF65-F5344CB8AC3E}">
-        <p14:creationId xmlns:p14="http://schemas.microsoft.com/office/powerpoint/2010/main" xmlns="" val="1333581381"/>
+        <p14:creationId xmlns:p14="http://schemas.microsoft.com/office/powerpoint/2010/main" val="1333581381"/>
       </p:ext>
     </p:extLst>
   </p:cSld>
@@ -179,7 +179,7 @@
   <p:timing>
     <p:tnLst>
       <p:par>
-        <p:cTn id="1" dur="indefinite" restart="never" nodeType="tmRoot"/>
+        <p:cTn xmlns:p14="http://schemas.microsoft.com/office/powerpoint/2010/main" id="1" dur="indefinite" restart="never" nodeType="tmRoot"/>
       </p:par>
     </p:tnLst>
   </p:timing>
@@ -206,7 +206,7 @@
     </p:spTree>
     <p:extLst>
       <p:ext uri="{BB962C8B-B14F-4D97-AF65-F5344CB8AC3E}">
-        <p14:creationId xmlns:p14="http://schemas.microsoft.com/office/powerpoint/2010/main" xmlns="" val="1891644360"/>
+        <p14:creationId xmlns:p14="http://schemas.microsoft.com/office/powerpoint/2010/main" val="1891644360"/>
       </p:ext>
     </p:extLst>
   </p:cSld>
@@ -216,7 +216,7 @@
   <p:timing>
     <p:tnLst>
       <p:par>
-        <p:cTn id="1" dur="indefinite" restart="never" nodeType="tmRoot"/>
+        <p:cTn xmlns:p14="http://schemas.microsoft.com/office/powerpoint/2010/main" id="1" dur="indefinite" restart="never" nodeType="tmRoot"/>
       </p:par>
     </p:tnLst>
   </p:timing>
@@ -243,7 +243,7 @@
     </p:spTree>
     <p:extLst>
       <p:ext uri="{BB962C8B-B14F-4D97-AF65-F5344CB8AC3E}">
-        <p14:creationId xmlns:p14="http://schemas.microsoft.com/office/powerpoint/2010/main" xmlns="" val="3239374206"/>
+        <p14:creationId xmlns:p14="http://schemas.microsoft.com/office/powerpoint/2010/main" val="3239374206"/>
       </p:ext>
     </p:extLst>
   </p:cSld>
@@ -253,7 +253,7 @@
   <p:timing>
     <p:tnLst>
       <p:par>
-        <p:cTn id="1" dur="indefinite" restart="never" nodeType="tmRoot"/>
+        <p:cTn xmlns:p14="http://schemas.microsoft.com/office/powerpoint/2010/main" id="1" dur="indefinite" restart="never" nodeType="tmRoot"/>
       </p:par>
     </p:tnLst>
   </p:timing>
@@ -280,7 +280,7 @@
     </p:spTree>
     <p:extLst>
       <p:ext uri="{BB962C8B-B14F-4D97-AF65-F5344CB8AC3E}">
-        <p14:creationId xmlns:p14="http://schemas.microsoft.com/office/powerpoint/2010/main" xmlns="" val="307310304"/>
+        <p14:creationId xmlns:p14="http://schemas.microsoft.com/office/powerpoint/2010/main" val="307310304"/>
       </p:ext>
     </p:extLst>
   </p:cSld>
@@ -290,7 +290,7 @@
   <p:timing>
     <p:tnLst>
       <p:par>
-        <p:cTn id="1" dur="indefinite" restart="never" nodeType="tmRoot"/>
+        <p:cTn xmlns:p14="http://schemas.microsoft.com/office/powerpoint/2010/main" id="1" dur="indefinite" restart="never" nodeType="tmRoot"/>
       </p:par>
     </p:tnLst>
   </p:timing>
@@ -317,7 +317,7 @@
     </p:spTree>
     <p:extLst>
       <p:ext uri="{BB962C8B-B14F-4D97-AF65-F5344CB8AC3E}">
-        <p14:creationId xmlns:p14="http://schemas.microsoft.com/office/powerpoint/2010/main" xmlns="" val="3978690955"/>
+        <p14:creationId xmlns:p14="http://schemas.microsoft.com/office/powerpoint/2010/main" val="3978690955"/>
       </p:ext>
     </p:extLst>
   </p:cSld>
@@ -327,7 +327,7 @@
   <p:timing>
     <p:tnLst>
       <p:par>
-        <p:cTn id="1" dur="indefinite" restart="never" nodeType="tmRoot"/>
+        <p:cTn xmlns:p14="http://schemas.microsoft.com/office/powerpoint/2010/main" id="1" dur="indefinite" restart="never" nodeType="tmRoot"/>
       </p:par>
     </p:tnLst>
   </p:timing>
@@ -354,7 +354,7 @@
     </p:spTree>
     <p:extLst>
       <p:ext uri="{BB962C8B-B14F-4D97-AF65-F5344CB8AC3E}">
-        <p14:creationId xmlns:p14="http://schemas.microsoft.com/office/powerpoint/2010/main" xmlns="" val="2351846119"/>
+        <p14:creationId xmlns:p14="http://schemas.microsoft.com/office/powerpoint/2010/main" val="2351846119"/>
       </p:ext>
     </p:extLst>
   </p:cSld>
@@ -364,7 +364,7 @@
   <p:timing>
     <p:tnLst>
       <p:par>
-        <p:cTn id="1" dur="indefinite" restart="never" nodeType="tmRoot"/>
+        <p:cTn xmlns:p14="http://schemas.microsoft.com/office/powerpoint/2010/main" id="1" dur="indefinite" restart="never" nodeType="tmRoot"/>
       </p:par>
     </p:tnLst>
   </p:timing>
@@ -391,7 +391,7 @@
     </p:spTree>
     <p:extLst>
       <p:ext uri="{BB962C8B-B14F-4D97-AF65-F5344CB8AC3E}">
-        <p14:creationId xmlns:p14="http://schemas.microsoft.com/office/powerpoint/2010/main" xmlns="" val="3469546082"/>
+        <p14:creationId xmlns:p14="http://schemas.microsoft.com/office/powerpoint/2010/main" val="3469546082"/>
       </p:ext>
     </p:extLst>
   </p:cSld>
@@ -401,7 +401,7 @@
   <p:timing>
     <p:tnLst>
       <p:par>
-        <p:cTn id="1" dur="indefinite" restart="never" nodeType="tmRoot"/>
+        <p:cTn xmlns:p14="http://schemas.microsoft.com/office/powerpoint/2010/main" id="1" dur="indefinite" restart="never" nodeType="tmRoot"/>
       </p:par>
     </p:tnLst>
   </p:timing>
@@ -451,7 +451,7 @@
             <a:fld id="{5001C876-01F7-4317-94B9-1AE222133113}" type="datetimeFigureOut">
               <a:rPr lang="es-ES" smtClean="0"/>
               <a:pPr/>
-              <a:t>02/03/2016</a:t>
+              <a:t>15/03/16</a:t>
             </a:fld>
             <a:endParaRPr lang="es-ES"/>
           </a:p>
@@ -510,7 +510,7 @@
             <a:fld id="{58140F73-F5A2-4B82-A2FA-BF1850CF1309}" type="slidenum">
               <a:rPr lang="es-ES" smtClean="0"/>
               <a:pPr/>
-              <a:t>‹Nº›</a:t>
+              <a:t>‹Nr.›</a:t>
             </a:fld>
             <a:endParaRPr lang="es-ES"/>
           </a:p>
@@ -519,7 +519,7 @@
     </p:spTree>
     <p:extLst>
       <p:ext uri="{BB962C8B-B14F-4D97-AF65-F5344CB8AC3E}">
-        <p14:creationId xmlns:p14="http://schemas.microsoft.com/office/powerpoint/2010/main" xmlns="" val="1897143918"/>
+        <p14:creationId xmlns:p14="http://schemas.microsoft.com/office/powerpoint/2010/main" val="1897143918"/>
       </p:ext>
     </p:extLst>
   </p:cSld>
@@ -529,7 +529,7 @@
   <p:timing>
     <p:tnLst>
       <p:par>
-        <p:cTn id="1" dur="indefinite" restart="never" nodeType="tmRoot"/>
+        <p:cTn xmlns:p14="http://schemas.microsoft.com/office/powerpoint/2010/main" id="1" dur="indefinite" restart="never" nodeType="tmRoot"/>
       </p:par>
     </p:tnLst>
   </p:timing>
@@ -556,7 +556,7 @@
     </p:spTree>
     <p:extLst>
       <p:ext uri="{BB962C8B-B14F-4D97-AF65-F5344CB8AC3E}">
-        <p14:creationId xmlns:p14="http://schemas.microsoft.com/office/powerpoint/2010/main" xmlns="" val="1289426299"/>
+        <p14:creationId xmlns:p14="http://schemas.microsoft.com/office/powerpoint/2010/main" val="1289426299"/>
       </p:ext>
     </p:extLst>
   </p:cSld>
@@ -566,7 +566,7 @@
   <p:timing>
     <p:tnLst>
       <p:par>
-        <p:cTn id="1" dur="indefinite" restart="never" nodeType="tmRoot"/>
+        <p:cTn xmlns:p14="http://schemas.microsoft.com/office/powerpoint/2010/main" id="1" dur="indefinite" restart="never" nodeType="tmRoot"/>
       </p:par>
     </p:tnLst>
   </p:timing>
@@ -593,7 +593,7 @@
     </p:spTree>
     <p:extLst>
       <p:ext uri="{BB962C8B-B14F-4D97-AF65-F5344CB8AC3E}">
-        <p14:creationId xmlns:p14="http://schemas.microsoft.com/office/powerpoint/2010/main" xmlns="" val="382388284"/>
+        <p14:creationId xmlns:p14="http://schemas.microsoft.com/office/powerpoint/2010/main" val="382388284"/>
       </p:ext>
     </p:extLst>
   </p:cSld>
@@ -603,7 +603,7 @@
   <p:timing>
     <p:tnLst>
       <p:par>
-        <p:cTn id="1" dur="indefinite" restart="never" nodeType="tmRoot"/>
+        <p:cTn xmlns:p14="http://schemas.microsoft.com/office/powerpoint/2010/main" id="1" dur="indefinite" restart="never" nodeType="tmRoot"/>
       </p:par>
     </p:tnLst>
   </p:timing>
@@ -674,7 +674,7 @@
           <a:blip r:embed="rId13" cstate="print">
             <a:extLst>
               <a:ext uri="{28A0092B-C50C-407E-A947-70E740481C1C}">
-                <a14:useLocalDpi xmlns:a14="http://schemas.microsoft.com/office/drawing/2010/main" xmlns="" val="0"/>
+                <a14:useLocalDpi xmlns:a14="http://schemas.microsoft.com/office/drawing/2010/main" val="0"/>
               </a:ext>
             </a:extLst>
           </a:blip>
@@ -695,7 +695,7 @@
     </p:spTree>
     <p:extLst>
       <p:ext uri="{BB962C8B-B14F-4D97-AF65-F5344CB8AC3E}">
-        <p14:creationId xmlns:p14="http://schemas.microsoft.com/office/powerpoint/2010/main" xmlns="" val="1541031311"/>
+        <p14:creationId xmlns:p14="http://schemas.microsoft.com/office/powerpoint/2010/main" val="1541031311"/>
       </p:ext>
     </p:extLst>
   </p:cSld>
@@ -716,7 +716,7 @@
   <p:timing>
     <p:tnLst>
       <p:par>
-        <p:cTn id="1" dur="indefinite" restart="never" nodeType="tmRoot"/>
+        <p:cTn xmlns:p14="http://schemas.microsoft.com/office/powerpoint/2010/main" id="1" dur="indefinite" restart="never" nodeType="tmRoot"/>
       </p:par>
     </p:tnLst>
   </p:timing>
@@ -1121,19 +1121,7 @@
             <a:pPr algn="ctr"/>
             <a:r>
               <a:rPr lang="es-ES" sz="1600" dirty="0" smtClean="0"/>
-              <a:t>Sistema </a:t>
-            </a:r>
-            <a:r>
-              <a:rPr lang="es-ES" sz="1600" dirty="0" smtClean="0"/>
-              <a:t>Internacional </a:t>
-            </a:r>
-            <a:r>
-              <a:rPr lang="es-ES" sz="1600" dirty="0" smtClean="0"/>
-              <a:t>de </a:t>
-            </a:r>
-            <a:r>
-              <a:rPr lang="es-ES" sz="1600" dirty="0" smtClean="0"/>
-              <a:t>Unidades</a:t>
+              <a:t>Sistema Internacional de Unidades</a:t>
             </a:r>
             <a:endParaRPr lang="es-ES" sz="1600" dirty="0"/>
           </a:p>
@@ -1182,7 +1170,7 @@
         </p:nvSpPr>
         <p:spPr>
           <a:xfrm>
-            <a:off x="370940" y="2466523"/>
+            <a:off x="383640" y="2466523"/>
             <a:ext cx="1210057" cy="605245"/>
           </a:xfrm>
           <a:prstGeom prst="rect">
@@ -1302,7 +1290,7 @@
         </p:nvSpPr>
         <p:spPr>
           <a:xfrm>
-            <a:off x="3132429" y="2466609"/>
+            <a:off x="3792829" y="2466609"/>
             <a:ext cx="1069287" cy="605245"/>
           </a:xfrm>
           <a:prstGeom prst="rect">
@@ -1362,7 +1350,7 @@
         </p:nvSpPr>
         <p:spPr>
           <a:xfrm>
-            <a:off x="5563467" y="2466523"/>
+            <a:off x="6579467" y="2466523"/>
             <a:ext cx="1051136" cy="605245"/>
           </a:xfrm>
           <a:prstGeom prst="rect">
@@ -1422,7 +1410,7 @@
         </p:nvSpPr>
         <p:spPr>
           <a:xfrm>
-            <a:off x="6742555" y="2467234"/>
+            <a:off x="7733155" y="2467234"/>
             <a:ext cx="1105774" cy="605245"/>
           </a:xfrm>
           <a:prstGeom prst="rect">
@@ -1482,7 +1470,7 @@
         </p:nvSpPr>
         <p:spPr>
           <a:xfrm>
-            <a:off x="265952" y="3196685"/>
+            <a:off x="278652" y="3196685"/>
             <a:ext cx="1394243" cy="276999"/>
           </a:xfrm>
           <a:prstGeom prst="rect">
@@ -1517,7 +1505,7 @@
         </p:nvCxnSpPr>
         <p:spPr>
           <a:xfrm rot="5400000">
-            <a:off x="886344" y="3171470"/>
+            <a:off x="899044" y="3171470"/>
             <a:ext cx="153462" cy="1"/>
           </a:xfrm>
           <a:prstGeom prst="bentConnector3">
@@ -1552,7 +1540,7 @@
         </p:nvSpPr>
         <p:spPr>
           <a:xfrm>
-            <a:off x="358041" y="3601521"/>
+            <a:off x="370741" y="3601521"/>
             <a:ext cx="1210057" cy="605245"/>
           </a:xfrm>
           <a:prstGeom prst="rect">
@@ -1620,7 +1608,7 @@
         </p:nvSpPr>
         <p:spPr>
           <a:xfrm>
-            <a:off x="154546" y="4816314"/>
+            <a:off x="52946" y="4816314"/>
             <a:ext cx="1641844" cy="605245"/>
           </a:xfrm>
           <a:prstGeom prst="rect">
@@ -1660,34 +1648,18 @@
                   <a:schemeClr val="tx1"/>
                 </a:solidFill>
               </a:rPr>
-              <a:t>kilómetro </a:t>
-            </a:r>
+              <a:t>kilómetro (km)</a:t>
+            </a:r>
+          </a:p>
+          <a:p>
+            <a:pPr algn="ctr"/>
             <a:r>
               <a:rPr lang="es-ES" sz="1400" dirty="0" smtClean="0">
                 <a:solidFill>
                   <a:schemeClr val="tx1"/>
                 </a:solidFill>
               </a:rPr>
-              <a:t>(km)</a:t>
-            </a:r>
-          </a:p>
-          <a:p>
-            <a:pPr algn="ctr"/>
-            <a:r>
-              <a:rPr lang="es-ES" sz="1400" dirty="0" smtClean="0">
-                <a:solidFill>
-                  <a:schemeClr val="tx1"/>
-                </a:solidFill>
-              </a:rPr>
-              <a:t>hectómetro </a:t>
-            </a:r>
-            <a:r>
-              <a:rPr lang="es-ES" sz="1400" dirty="0" smtClean="0">
-                <a:solidFill>
-                  <a:schemeClr val="tx1"/>
-                </a:solidFill>
-              </a:rPr>
-              <a:t>(hm)</a:t>
+              <a:t>hectómetro (hm)</a:t>
             </a:r>
           </a:p>
           <a:p>
@@ -1735,7 +1707,7 @@
         </p:nvSpPr>
         <p:spPr>
           <a:xfrm>
-            <a:off x="154547" y="6005480"/>
+            <a:off x="78347" y="6005480"/>
             <a:ext cx="1641844" cy="605245"/>
           </a:xfrm>
           <a:prstGeom prst="rect">
@@ -1775,15 +1747,18 @@
                   <a:schemeClr val="tx1"/>
                 </a:solidFill>
               </a:rPr>
-              <a:t>decímetro </a:t>
-            </a:r>
+              <a:t>decímetro (dm)</a:t>
+            </a:r>
+          </a:p>
+          <a:p>
+            <a:pPr algn="ctr"/>
             <a:r>
               <a:rPr lang="es-ES" sz="1400" dirty="0" smtClean="0">
                 <a:solidFill>
                   <a:schemeClr val="tx1"/>
                 </a:solidFill>
               </a:rPr>
-              <a:t>(dm)</a:t>
+              <a:t>centímetro (cm)</a:t>
             </a:r>
           </a:p>
           <a:p>
@@ -1794,34 +1769,7 @@
                   <a:schemeClr val="tx1"/>
                 </a:solidFill>
               </a:rPr>
-              <a:t>centímetro </a:t>
-            </a:r>
-            <a:r>
-              <a:rPr lang="es-ES" sz="1400" dirty="0" smtClean="0">
-                <a:solidFill>
-                  <a:schemeClr val="tx1"/>
-                </a:solidFill>
-              </a:rPr>
-              <a:t>(cm)</a:t>
-            </a:r>
-          </a:p>
-          <a:p>
-            <a:pPr algn="ctr"/>
-            <a:r>
-              <a:rPr lang="es-ES" sz="1400" dirty="0" smtClean="0">
-                <a:solidFill>
-                  <a:schemeClr val="tx1"/>
-                </a:solidFill>
-              </a:rPr>
-              <a:t>milímetro </a:t>
-            </a:r>
-            <a:r>
-              <a:rPr lang="es-ES" sz="1400" dirty="0" smtClean="0">
-                <a:solidFill>
-                  <a:schemeClr val="tx1"/>
-                </a:solidFill>
-              </a:rPr>
-              <a:t>(mm)</a:t>
+              <a:t>milímetro (mm)</a:t>
             </a:r>
             <a:endParaRPr lang="es-ES" sz="1400" dirty="0">
               <a:solidFill>
@@ -1839,7 +1787,7 @@
         </p:nvSpPr>
         <p:spPr>
           <a:xfrm>
-            <a:off x="265952" y="4385853"/>
+            <a:off x="278652" y="4385853"/>
             <a:ext cx="1394243" cy="276999"/>
           </a:xfrm>
           <a:prstGeom prst="rect">
@@ -1873,7 +1821,7 @@
         </p:nvCxnSpPr>
         <p:spPr>
           <a:xfrm rot="5400000">
-            <a:off x="899154" y="3537600"/>
+            <a:off x="911854" y="3537600"/>
             <a:ext cx="127837" cy="4"/>
           </a:xfrm>
           <a:prstGeom prst="bentConnector3">
@@ -1913,7 +1861,7 @@
         </p:nvCxnSpPr>
         <p:spPr>
           <a:xfrm rot="16200000" flipH="1">
-            <a:off x="873529" y="4296307"/>
+            <a:off x="886229" y="4296307"/>
             <a:ext cx="179087" cy="4"/>
           </a:xfrm>
           <a:prstGeom prst="bentConnector3">
@@ -1950,7 +1898,7 @@
         </p:nvSpPr>
         <p:spPr>
           <a:xfrm>
-            <a:off x="265950" y="5575021"/>
+            <a:off x="278650" y="5575021"/>
             <a:ext cx="1394243" cy="276999"/>
           </a:xfrm>
           <a:prstGeom prst="rect">
@@ -2050,15 +1998,17 @@
       <p:cxnSp>
         <p:nvCxnSpPr>
           <p:cNvPr id="78" name="Conector angular 77"/>
-          <p:cNvCxnSpPr/>
+          <p:cNvCxnSpPr>
+            <a:endCxn id="60" idx="0"/>
+          </p:cNvCxnSpPr>
           <p:nvPr/>
         </p:nvCxnSpPr>
         <p:spPr>
-          <a:xfrm rot="16200000" flipH="1">
-            <a:off x="5899157" y="1241072"/>
-            <a:ext cx="72000" cy="2340000"/>
-          </a:xfrm>
-          <a:prstGeom prst="bentConnector3">
+          <a:xfrm>
+            <a:off x="4765157" y="2375072"/>
+            <a:ext cx="3520885" cy="92162"/>
+          </a:xfrm>
+          <a:prstGeom prst="bentConnector2">
             <a:avLst/>
           </a:prstGeom>
           <a:ln w="12700">
@@ -2089,9 +2039,9 @@
           <p:nvPr/>
         </p:nvCxnSpPr>
         <p:spPr>
-          <a:xfrm rot="27000000" flipH="1">
-            <a:off x="4837494" y="2297208"/>
-            <a:ext cx="72000" cy="216000"/>
+          <a:xfrm rot="10800000">
+            <a:off x="4765494" y="2369208"/>
+            <a:ext cx="1254306" cy="5692"/>
           </a:xfrm>
           <a:prstGeom prst="bentConnector3">
             <a:avLst/>
@@ -2212,11 +2162,7 @@
             <a:pPr algn="ctr"/>
             <a:r>
               <a:rPr lang="es-ES" sz="1200" dirty="0" smtClean="0"/>
-              <a:t>se </a:t>
-            </a:r>
-            <a:r>
-              <a:rPr lang="es-ES" sz="1200" dirty="0" smtClean="0"/>
-              <a:t>rigen por</a:t>
+              <a:t>se rigen por</a:t>
             </a:r>
             <a:endParaRPr lang="es-ES" sz="1200" dirty="0"/>
           </a:p>
@@ -2265,7 +2211,7 @@
         </p:nvCxnSpPr>
         <p:spPr>
           <a:xfrm rot="5400000">
-            <a:off x="3598334" y="3166150"/>
+            <a:off x="4296834" y="3166150"/>
             <a:ext cx="153462" cy="1"/>
           </a:xfrm>
           <a:prstGeom prst="bentConnector3">
@@ -2300,7 +2246,7 @@
         </p:nvCxnSpPr>
         <p:spPr>
           <a:xfrm rot="5400000">
-            <a:off x="6011989" y="3128206"/>
+            <a:off x="7091489" y="3128206"/>
             <a:ext cx="153462" cy="1"/>
           </a:xfrm>
           <a:prstGeom prst="bentConnector3">
@@ -2337,7 +2283,7 @@
         </p:nvCxnSpPr>
         <p:spPr>
           <a:xfrm rot="5400000">
-            <a:off x="7218710" y="3162887"/>
+            <a:off x="8272810" y="3162887"/>
             <a:ext cx="153462" cy="1"/>
           </a:xfrm>
           <a:prstGeom prst="bentConnector3">
@@ -2407,7 +2353,7 @@
         </p:nvSpPr>
         <p:spPr>
           <a:xfrm>
-            <a:off x="3017440" y="3207343"/>
+            <a:off x="3677840" y="3207343"/>
             <a:ext cx="1394243" cy="276999"/>
           </a:xfrm>
           <a:prstGeom prst="rect">
@@ -2442,7 +2388,7 @@
         </p:nvSpPr>
         <p:spPr>
           <a:xfrm>
-            <a:off x="5424543" y="3188299"/>
+            <a:off x="6440543" y="3188299"/>
             <a:ext cx="1394243" cy="276999"/>
           </a:xfrm>
           <a:prstGeom prst="rect">
@@ -2477,7 +2423,7 @@
         </p:nvSpPr>
         <p:spPr>
           <a:xfrm>
-            <a:off x="6626876" y="3213880"/>
+            <a:off x="7617476" y="3213880"/>
             <a:ext cx="1394243" cy="276999"/>
           </a:xfrm>
           <a:prstGeom prst="rect">
@@ -2512,7 +2458,7 @@
         </p:nvCxnSpPr>
         <p:spPr>
           <a:xfrm rot="16200000" flipH="1">
-            <a:off x="7232401" y="3524790"/>
+            <a:off x="8286501" y="3524790"/>
             <a:ext cx="153462" cy="1"/>
           </a:xfrm>
           <a:prstGeom prst="bentConnector3">
@@ -2549,7 +2495,7 @@
         </p:nvCxnSpPr>
         <p:spPr>
           <a:xfrm rot="16200000" flipH="1">
-            <a:off x="6012984" y="3546457"/>
+            <a:off x="7092484" y="3546457"/>
             <a:ext cx="153462" cy="1"/>
           </a:xfrm>
           <a:prstGeom prst="bentConnector3">
@@ -2586,7 +2532,7 @@
         </p:nvCxnSpPr>
         <p:spPr>
           <a:xfrm rot="16200000" flipH="1">
-            <a:off x="3598333" y="3535588"/>
+            <a:off x="4296833" y="3535588"/>
             <a:ext cx="153462" cy="1"/>
           </a:xfrm>
           <a:prstGeom prst="bentConnector3">
@@ -2660,7 +2606,7 @@
         </p:nvSpPr>
         <p:spPr>
           <a:xfrm>
-            <a:off x="3165779" y="3626717"/>
+            <a:off x="3826179" y="3626717"/>
             <a:ext cx="1061877" cy="605245"/>
           </a:xfrm>
           <a:prstGeom prst="rect">
@@ -2710,23 +2656,7 @@
                   <a:schemeClr val="tx1"/>
                 </a:solidFill>
               </a:rPr>
-              <a:t>etro cúbico (m</a:t>
-            </a:r>
-            <a:r>
-              <a:rPr lang="es-ES" sz="1400" baseline="30000" dirty="0" smtClean="0">
-                <a:solidFill>
-                  <a:schemeClr val="tx1"/>
-                </a:solidFill>
-              </a:rPr>
-              <a:t>3</a:t>
-            </a:r>
-            <a:r>
-              <a:rPr lang="es-ES" sz="1400" dirty="0" smtClean="0">
-                <a:solidFill>
-                  <a:schemeClr val="tx1"/>
-                </a:solidFill>
-              </a:rPr>
-              <a:t>)</a:t>
+              <a:t>etro cúbico </a:t>
             </a:r>
             <a:endParaRPr lang="es-ES" sz="1400" dirty="0">
               <a:solidFill>
@@ -2794,15 +2724,7 @@
                   <a:schemeClr val="tx1"/>
                 </a:solidFill>
               </a:rPr>
-              <a:t>etro cuadrado (m</a:t>
-            </a:r>
-            <a:r>
-              <a:rPr lang="es-ES" sz="1400" baseline="30000" dirty="0" smtClean="0">
-                <a:solidFill>
-                  <a:schemeClr val="tx1"/>
-                </a:solidFill>
-              </a:rPr>
-              <a:t>2</a:t>
+              <a:t>etro </a:t>
             </a:r>
             <a:r>
               <a:rPr lang="es-ES" sz="1400" dirty="0" smtClean="0">
@@ -2810,7 +2732,7 @@
                   <a:schemeClr val="tx1"/>
                 </a:solidFill>
               </a:rPr>
-              <a:t>)</a:t>
+              <a:t>cuadrado</a:t>
             </a:r>
             <a:endParaRPr lang="es-ES" sz="1400" dirty="0">
               <a:solidFill>
@@ -2828,7 +2750,7 @@
         </p:nvSpPr>
         <p:spPr>
           <a:xfrm>
-            <a:off x="5525283" y="3622415"/>
+            <a:off x="6541283" y="3622415"/>
             <a:ext cx="1101593" cy="605245"/>
           </a:xfrm>
           <a:prstGeom prst="rect">
@@ -2896,7 +2818,7 @@
         </p:nvSpPr>
         <p:spPr>
           <a:xfrm>
-            <a:off x="6828314" y="3622415"/>
+            <a:off x="7818914" y="3622415"/>
             <a:ext cx="1039994" cy="605245"/>
           </a:xfrm>
           <a:prstGeom prst="rect">
@@ -3003,41 +2925,6 @@
       </p:cxnSp>
       <p:cxnSp>
         <p:nvCxnSpPr>
-          <p:cNvPr id="47" name="Conector angular 46"/>
-          <p:cNvCxnSpPr/>
-          <p:nvPr/>
-        </p:nvCxnSpPr>
-        <p:spPr>
-          <a:xfrm rot="5400000">
-            <a:off x="1337104" y="3171470"/>
-            <a:ext cx="153462" cy="1"/>
-          </a:xfrm>
-          <a:prstGeom prst="bentConnector3">
-            <a:avLst/>
-          </a:prstGeom>
-          <a:ln w="12700">
-            <a:solidFill>
-              <a:schemeClr val="tx1"/>
-            </a:solidFill>
-          </a:ln>
-        </p:spPr>
-        <p:style>
-          <a:lnRef idx="1">
-            <a:schemeClr val="accent1"/>
-          </a:lnRef>
-          <a:fillRef idx="0">
-            <a:schemeClr val="accent1"/>
-          </a:fillRef>
-          <a:effectRef idx="0">
-            <a:schemeClr val="accent1"/>
-          </a:effectRef>
-          <a:fontRef idx="minor">
-            <a:schemeClr val="tx1"/>
-          </a:fontRef>
-        </p:style>
-      </p:cxnSp>
-      <p:cxnSp>
-        <p:nvCxnSpPr>
           <p:cNvPr id="66" name="Conector angular 65"/>
           <p:cNvCxnSpPr/>
           <p:nvPr/>
@@ -3252,110 +3139,6 @@
           </a:fontRef>
         </p:style>
       </p:cxnSp>
-      <p:sp>
-        <p:nvSpPr>
-          <p:cNvPr id="86" name="Rectángulo 85"/>
-          <p:cNvSpPr/>
-          <p:nvPr/>
-        </p:nvSpPr>
-        <p:spPr>
-          <a:xfrm>
-            <a:off x="1884720" y="4814275"/>
-            <a:ext cx="1050904" cy="605245"/>
-          </a:xfrm>
-          <a:prstGeom prst="rect">
-            <a:avLst/>
-          </a:prstGeom>
-          <a:solidFill>
-            <a:schemeClr val="bg1"/>
-          </a:solidFill>
-          <a:ln>
-            <a:solidFill>
-              <a:schemeClr val="tx1"/>
-            </a:solidFill>
-          </a:ln>
-        </p:spPr>
-        <p:style>
-          <a:lnRef idx="2">
-            <a:schemeClr val="accent6"/>
-          </a:lnRef>
-          <a:fillRef idx="1">
-            <a:schemeClr val="lt1"/>
-          </a:fillRef>
-          <a:effectRef idx="0">
-            <a:schemeClr val="accent6"/>
-          </a:effectRef>
-          <a:fontRef idx="minor">
-            <a:schemeClr val="dk1"/>
-          </a:fontRef>
-        </p:style>
-        <p:txBody>
-          <a:bodyPr rtlCol="0" anchor="ctr"/>
-          <a:lstStyle/>
-          <a:p>
-            <a:pPr algn="ctr"/>
-            <a:r>
-              <a:rPr lang="es-ES" sz="1400" dirty="0" smtClean="0">
-                <a:solidFill>
-                  <a:schemeClr val="tx1"/>
-                </a:solidFill>
-              </a:rPr>
-              <a:t>km</a:t>
-            </a:r>
-            <a:r>
-              <a:rPr lang="es-ES" sz="1400" baseline="30000" dirty="0" smtClean="0">
-                <a:solidFill>
-                  <a:schemeClr val="tx1"/>
-                </a:solidFill>
-              </a:rPr>
-              <a:t>2</a:t>
-            </a:r>
-          </a:p>
-          <a:p>
-            <a:pPr algn="ctr"/>
-            <a:r>
-              <a:rPr lang="es-ES" sz="1400" dirty="0" smtClean="0">
-                <a:solidFill>
-                  <a:schemeClr val="tx1"/>
-                </a:solidFill>
-              </a:rPr>
-              <a:t>hm</a:t>
-            </a:r>
-            <a:r>
-              <a:rPr lang="es-ES" sz="1400" baseline="30000" dirty="0" smtClean="0">
-                <a:solidFill>
-                  <a:schemeClr val="tx1"/>
-                </a:solidFill>
-              </a:rPr>
-              <a:t>2</a:t>
-            </a:r>
-          </a:p>
-          <a:p>
-            <a:pPr algn="ctr"/>
-            <a:r>
-              <a:rPr lang="es-ES" sz="1400" dirty="0" smtClean="0">
-                <a:solidFill>
-                  <a:schemeClr val="tx1"/>
-                </a:solidFill>
-              </a:rPr>
-              <a:t>dam</a:t>
-            </a:r>
-            <a:r>
-              <a:rPr lang="es-ES" sz="1400" baseline="30000" dirty="0" smtClean="0">
-                <a:solidFill>
-                  <a:schemeClr val="tx1"/>
-                </a:solidFill>
-              </a:rPr>
-              <a:t>2</a:t>
-            </a:r>
-            <a:endParaRPr lang="es-ES" sz="1400" baseline="30000" dirty="0">
-              <a:solidFill>
-                <a:schemeClr val="tx1"/>
-              </a:solidFill>
-            </a:endParaRPr>
-          </a:p>
-        </p:txBody>
-      </p:sp>
       <p:cxnSp>
         <p:nvCxnSpPr>
           <p:cNvPr id="87" name="Conector angular 86"/>
@@ -3461,110 +3244,6 @@
           </a:fontRef>
         </p:style>
       </p:cxnSp>
-      <p:sp>
-        <p:nvSpPr>
-          <p:cNvPr id="90" name="Rectángulo 89"/>
-          <p:cNvSpPr/>
-          <p:nvPr/>
-        </p:nvSpPr>
-        <p:spPr>
-          <a:xfrm>
-            <a:off x="1884719" y="6005336"/>
-            <a:ext cx="1050904" cy="605245"/>
-          </a:xfrm>
-          <a:prstGeom prst="rect">
-            <a:avLst/>
-          </a:prstGeom>
-          <a:solidFill>
-            <a:schemeClr val="bg1"/>
-          </a:solidFill>
-          <a:ln>
-            <a:solidFill>
-              <a:schemeClr val="tx1"/>
-            </a:solidFill>
-          </a:ln>
-        </p:spPr>
-        <p:style>
-          <a:lnRef idx="2">
-            <a:schemeClr val="accent6"/>
-          </a:lnRef>
-          <a:fillRef idx="1">
-            <a:schemeClr val="lt1"/>
-          </a:fillRef>
-          <a:effectRef idx="0">
-            <a:schemeClr val="accent6"/>
-          </a:effectRef>
-          <a:fontRef idx="minor">
-            <a:schemeClr val="dk1"/>
-          </a:fontRef>
-        </p:style>
-        <p:txBody>
-          <a:bodyPr rtlCol="0" anchor="ctr"/>
-          <a:lstStyle/>
-          <a:p>
-            <a:pPr algn="ctr"/>
-            <a:r>
-              <a:rPr lang="es-ES" sz="1400" dirty="0" smtClean="0">
-                <a:solidFill>
-                  <a:schemeClr val="tx1"/>
-                </a:solidFill>
-              </a:rPr>
-              <a:t>dm</a:t>
-            </a:r>
-            <a:r>
-              <a:rPr lang="es-ES" sz="1400" baseline="30000" dirty="0" smtClean="0">
-                <a:solidFill>
-                  <a:schemeClr val="tx1"/>
-                </a:solidFill>
-              </a:rPr>
-              <a:t>2</a:t>
-            </a:r>
-          </a:p>
-          <a:p>
-            <a:pPr algn="ctr"/>
-            <a:r>
-              <a:rPr lang="es-ES" sz="1400" dirty="0" smtClean="0">
-                <a:solidFill>
-                  <a:schemeClr val="tx1"/>
-                </a:solidFill>
-              </a:rPr>
-              <a:t>cm</a:t>
-            </a:r>
-            <a:r>
-              <a:rPr lang="es-ES" sz="1400" baseline="30000" dirty="0" smtClean="0">
-                <a:solidFill>
-                  <a:schemeClr val="tx1"/>
-                </a:solidFill>
-              </a:rPr>
-              <a:t>2</a:t>
-            </a:r>
-          </a:p>
-          <a:p>
-            <a:pPr algn="ctr"/>
-            <a:r>
-              <a:rPr lang="es-ES" sz="1400" dirty="0" smtClean="0">
-                <a:solidFill>
-                  <a:schemeClr val="tx1"/>
-                </a:solidFill>
-              </a:rPr>
-              <a:t>mm</a:t>
-            </a:r>
-            <a:r>
-              <a:rPr lang="es-ES" sz="1400" baseline="30000" dirty="0" smtClean="0">
-                <a:solidFill>
-                  <a:schemeClr val="tx1"/>
-                </a:solidFill>
-              </a:rPr>
-              <a:t>2</a:t>
-            </a:r>
-            <a:endParaRPr lang="es-ES" sz="1400" baseline="30000" dirty="0">
-              <a:solidFill>
-                <a:schemeClr val="tx1"/>
-              </a:solidFill>
-            </a:endParaRPr>
-          </a:p>
-        </p:txBody>
-      </p:sp>
       <p:cxnSp>
         <p:nvCxnSpPr>
           <p:cNvPr id="91" name="Conector angular 90"/>
@@ -3573,7 +3252,7 @@
         </p:nvCxnSpPr>
         <p:spPr>
           <a:xfrm rot="16200000" flipH="1">
-            <a:off x="3585522" y="4328123"/>
+            <a:off x="4284022" y="4328123"/>
             <a:ext cx="179087" cy="4"/>
           </a:xfrm>
           <a:prstGeom prst="bentConnector3">
@@ -3610,7 +3289,7 @@
         </p:nvSpPr>
         <p:spPr>
           <a:xfrm>
-            <a:off x="2999595" y="4387561"/>
+            <a:off x="3659995" y="4387561"/>
             <a:ext cx="1394243" cy="276999"/>
           </a:xfrm>
           <a:prstGeom prst="rect">
@@ -3641,7 +3320,7 @@
         </p:nvCxnSpPr>
         <p:spPr>
           <a:xfrm rot="16200000" flipH="1">
-            <a:off x="3581693" y="4749095"/>
+            <a:off x="4280193" y="4749095"/>
             <a:ext cx="179087" cy="4"/>
           </a:xfrm>
           <a:prstGeom prst="bentConnector3">
@@ -3678,8 +3357,8 @@
         </p:nvSpPr>
         <p:spPr>
           <a:xfrm>
-            <a:off x="3187054" y="4813540"/>
-            <a:ext cx="1051965" cy="605245"/>
+            <a:off x="3632200" y="4813540"/>
+            <a:ext cx="1574800" cy="605245"/>
           </a:xfrm>
           <a:prstGeom prst="rect">
             <a:avLst/>
@@ -3713,58 +3392,84 @@
           <a:p>
             <a:pPr algn="ctr"/>
             <a:r>
+              <a:rPr lang="es-ES" sz="1400" dirty="0">
+                <a:solidFill>
+                  <a:schemeClr val="tx1"/>
+                </a:solidFill>
+              </a:rPr>
+              <a:t>k</a:t>
+            </a:r>
+            <a:r>
               <a:rPr lang="es-ES" sz="1400" dirty="0" smtClean="0">
                 <a:solidFill>
                   <a:schemeClr val="tx1"/>
                 </a:solidFill>
               </a:rPr>
-              <a:t>km</a:t>
-            </a:r>
-            <a:r>
-              <a:rPr lang="es-ES" sz="1400" baseline="30000" dirty="0" smtClean="0">
-                <a:solidFill>
-                  <a:schemeClr val="tx1"/>
-                </a:solidFill>
-              </a:rPr>
-              <a:t>3</a:t>
-            </a:r>
-          </a:p>
-          <a:p>
-            <a:pPr algn="ctr"/>
+              <a:t>il</a:t>
+            </a:r>
             <a:r>
               <a:rPr lang="es-ES" sz="1400" dirty="0" smtClean="0">
                 <a:solidFill>
                   <a:schemeClr val="tx1"/>
                 </a:solidFill>
               </a:rPr>
-              <a:t>hm</a:t>
-            </a:r>
-            <a:r>
-              <a:rPr lang="es-ES" sz="1400" baseline="30000" dirty="0" smtClean="0">
-                <a:solidFill>
-                  <a:schemeClr val="tx1"/>
-                </a:solidFill>
-              </a:rPr>
-              <a:t>3</a:t>
-            </a:r>
-          </a:p>
-          <a:p>
-            <a:pPr algn="ctr"/>
+              <a:t>ómetro cúbico</a:t>
+            </a:r>
+            <a:endParaRPr lang="es-ES" sz="1400" baseline="30000" dirty="0" smtClean="0">
+              <a:solidFill>
+                <a:schemeClr val="tx1"/>
+              </a:solidFill>
+            </a:endParaRPr>
+          </a:p>
+          <a:p>
+            <a:pPr algn="ctr"/>
+            <a:r>
+              <a:rPr lang="es-ES" sz="1400" dirty="0">
+                <a:solidFill>
+                  <a:schemeClr val="tx1"/>
+                </a:solidFill>
+              </a:rPr>
+              <a:t>h</a:t>
+            </a:r>
             <a:r>
               <a:rPr lang="es-ES" sz="1400" dirty="0" smtClean="0">
                 <a:solidFill>
                   <a:schemeClr val="tx1"/>
                 </a:solidFill>
               </a:rPr>
-              <a:t>dam</a:t>
-            </a:r>
-            <a:r>
-              <a:rPr lang="es-ES" sz="1400" baseline="30000" dirty="0" smtClean="0">
-                <a:solidFill>
-                  <a:schemeClr val="tx1"/>
-                </a:solidFill>
-              </a:rPr>
-              <a:t>3</a:t>
+              <a:t>ect</a:t>
+            </a:r>
+            <a:r>
+              <a:rPr lang="es-ES" sz="1400" dirty="0" smtClean="0">
+                <a:solidFill>
+                  <a:schemeClr val="tx1"/>
+                </a:solidFill>
+              </a:rPr>
+              <a:t>ómetro cúbico</a:t>
+            </a:r>
+            <a:endParaRPr lang="es-ES" sz="1400" baseline="30000" dirty="0" smtClean="0">
+              <a:solidFill>
+                <a:schemeClr val="tx1"/>
+              </a:solidFill>
+            </a:endParaRPr>
+          </a:p>
+          <a:p>
+            <a:pPr algn="ctr"/>
+            <a:r>
+              <a:rPr lang="es-ES" sz="1400" dirty="0" smtClean="0">
+                <a:solidFill>
+                  <a:schemeClr val="tx1"/>
+                </a:solidFill>
+              </a:rPr>
+              <a:t>dec</a:t>
+            </a:r>
+            <a:r>
+              <a:rPr lang="es-ES" sz="1400" dirty="0" smtClean="0">
+                <a:solidFill>
+                  <a:schemeClr val="tx1"/>
+                </a:solidFill>
+              </a:rPr>
+              <a:t>ámetro cúbico</a:t>
             </a:r>
             <a:endParaRPr lang="es-ES" sz="1400" baseline="30000" dirty="0">
               <a:solidFill>
@@ -3782,7 +3487,7 @@
         </p:nvCxnSpPr>
         <p:spPr>
           <a:xfrm rot="16200000" flipH="1">
-            <a:off x="3585522" y="5523338"/>
+            <a:off x="4284022" y="5523338"/>
             <a:ext cx="179087" cy="4"/>
           </a:xfrm>
           <a:prstGeom prst="bentConnector3">
@@ -3819,7 +3524,7 @@
         </p:nvSpPr>
         <p:spPr>
           <a:xfrm>
-            <a:off x="2970829" y="5564650"/>
+            <a:off x="3631229" y="5564650"/>
             <a:ext cx="1419061" cy="276999"/>
           </a:xfrm>
           <a:prstGeom prst="rect">
@@ -3836,11 +3541,7 @@
             <a:pPr algn="ctr"/>
             <a:r>
               <a:rPr lang="es-ES" sz="1200" dirty="0" smtClean="0"/>
-              <a:t>s</a:t>
-            </a:r>
-            <a:r>
-              <a:rPr lang="es-ES" sz="1200" dirty="0" smtClean="0"/>
-              <a:t>ubmúltiplos</a:t>
+              <a:t>submúltiplos</a:t>
             </a:r>
             <a:endParaRPr lang="es-ES" sz="1200" baseline="30000" dirty="0"/>
           </a:p>
@@ -3854,7 +3555,7 @@
         </p:nvCxnSpPr>
         <p:spPr>
           <a:xfrm rot="16200000" flipH="1">
-            <a:off x="3577527" y="5928749"/>
+            <a:off x="4276027" y="5928749"/>
             <a:ext cx="179087" cy="4"/>
           </a:xfrm>
           <a:prstGeom prst="bentConnector3">
@@ -3891,8 +3592,8 @@
         </p:nvSpPr>
         <p:spPr>
           <a:xfrm>
-            <a:off x="3181878" y="5991752"/>
-            <a:ext cx="1029675" cy="605245"/>
+            <a:off x="3683000" y="5991752"/>
+            <a:ext cx="1600200" cy="605245"/>
           </a:xfrm>
           <a:prstGeom prst="rect">
             <a:avLst/>
@@ -3926,58 +3627,92 @@
           <a:p>
             <a:pPr algn="ctr"/>
             <a:r>
+              <a:rPr lang="es-ES" sz="1400" dirty="0">
+                <a:solidFill>
+                  <a:schemeClr val="tx1"/>
+                </a:solidFill>
+              </a:rPr>
+              <a:t>d</a:t>
+            </a:r>
+            <a:r>
               <a:rPr lang="es-ES" sz="1400" dirty="0" smtClean="0">
                 <a:solidFill>
                   <a:schemeClr val="tx1"/>
                 </a:solidFill>
               </a:rPr>
-              <a:t>dm</a:t>
-            </a:r>
-            <a:r>
-              <a:rPr lang="es-ES" sz="1400" baseline="30000" dirty="0" smtClean="0">
-                <a:solidFill>
-                  <a:schemeClr val="tx1"/>
-                </a:solidFill>
-              </a:rPr>
-              <a:t>3</a:t>
-            </a:r>
-          </a:p>
-          <a:p>
-            <a:pPr algn="ctr"/>
+              <a:t>ec</a:t>
+            </a:r>
             <a:r>
               <a:rPr lang="es-ES" sz="1400" dirty="0" smtClean="0">
                 <a:solidFill>
                   <a:schemeClr val="tx1"/>
                 </a:solidFill>
               </a:rPr>
-              <a:t>cm</a:t>
-            </a:r>
-            <a:r>
-              <a:rPr lang="es-ES" sz="1400" baseline="30000" dirty="0" smtClean="0">
-                <a:solidFill>
-                  <a:schemeClr val="tx1"/>
-                </a:solidFill>
-              </a:rPr>
-              <a:t>3</a:t>
-            </a:r>
-          </a:p>
-          <a:p>
-            <a:pPr algn="ctr"/>
+              <a:t>ímetro cúbico</a:t>
+            </a:r>
+            <a:endParaRPr lang="es-ES" sz="1400" baseline="30000" dirty="0" smtClean="0">
+              <a:solidFill>
+                <a:schemeClr val="tx1"/>
+              </a:solidFill>
+            </a:endParaRPr>
+          </a:p>
+          <a:p>
+            <a:pPr algn="ctr"/>
+            <a:r>
+              <a:rPr lang="es-ES" sz="1400" dirty="0">
+                <a:solidFill>
+                  <a:schemeClr val="tx1"/>
+                </a:solidFill>
+              </a:rPr>
+              <a:t>c</a:t>
+            </a:r>
             <a:r>
               <a:rPr lang="es-ES" sz="1400" dirty="0" smtClean="0">
                 <a:solidFill>
                   <a:schemeClr val="tx1"/>
                 </a:solidFill>
               </a:rPr>
-              <a:t>mm</a:t>
-            </a:r>
-            <a:r>
-              <a:rPr lang="es-ES" sz="1400" baseline="30000" dirty="0" smtClean="0">
-                <a:solidFill>
-                  <a:schemeClr val="tx1"/>
-                </a:solidFill>
-              </a:rPr>
-              <a:t>3</a:t>
+              <a:t>ent</a:t>
+            </a:r>
+            <a:r>
+              <a:rPr lang="es-ES" sz="1400" dirty="0" smtClean="0">
+                <a:solidFill>
+                  <a:schemeClr val="tx1"/>
+                </a:solidFill>
+              </a:rPr>
+              <a:t>ímetro cúbico</a:t>
+            </a:r>
+            <a:endParaRPr lang="es-ES" sz="1400" baseline="30000" dirty="0" smtClean="0">
+              <a:solidFill>
+                <a:schemeClr val="tx1"/>
+              </a:solidFill>
+            </a:endParaRPr>
+          </a:p>
+          <a:p>
+            <a:pPr algn="ctr"/>
+            <a:r>
+              <a:rPr lang="es-ES" sz="1400" dirty="0">
+                <a:solidFill>
+                  <a:schemeClr val="tx1"/>
+                </a:solidFill>
+              </a:rPr>
+              <a:t>m</a:t>
+            </a:r>
+            <a:r>
+              <a:rPr lang="es-ES" sz="1400" dirty="0" smtClean="0">
+                <a:solidFill>
+                  <a:schemeClr val="tx1"/>
+                </a:solidFill>
+              </a:rPr>
+              <a:t>il</a:t>
+            </a:r>
+            <a:r>
+              <a:rPr lang="es-ES" sz="1400" dirty="0" smtClean="0">
+                <a:solidFill>
+                  <a:schemeClr val="tx1"/>
+                </a:solidFill>
+              </a:rPr>
+              <a:t>ímetro cúbico</a:t>
             </a:r>
             <a:endParaRPr lang="es-ES" sz="1400" baseline="30000" dirty="0">
               <a:solidFill>
@@ -3995,7 +3730,7 @@
         </p:nvSpPr>
         <p:spPr>
           <a:xfrm>
-            <a:off x="4402700" y="2476615"/>
+            <a:off x="5431400" y="2476615"/>
             <a:ext cx="1051136" cy="605245"/>
           </a:xfrm>
           <a:prstGeom prst="rect">
@@ -4055,7 +3790,7 @@
         </p:nvCxnSpPr>
         <p:spPr>
           <a:xfrm rot="5400000">
-            <a:off x="4820727" y="3162887"/>
+            <a:off x="5912927" y="3162887"/>
             <a:ext cx="153462" cy="1"/>
           </a:xfrm>
           <a:prstGeom prst="bentConnector3">
@@ -4090,7 +3825,7 @@
         </p:nvSpPr>
         <p:spPr>
           <a:xfrm>
-            <a:off x="4200147" y="3228970"/>
+            <a:off x="5228847" y="3228970"/>
             <a:ext cx="1394243" cy="276999"/>
           </a:xfrm>
           <a:prstGeom prst="rect">
@@ -4125,7 +3860,7 @@
         </p:nvSpPr>
         <p:spPr>
           <a:xfrm>
-            <a:off x="4348917" y="3624468"/>
+            <a:off x="5377617" y="3624468"/>
             <a:ext cx="1061877" cy="605245"/>
           </a:xfrm>
           <a:prstGeom prst="rect">
@@ -4193,7 +3928,7 @@
         </p:nvCxnSpPr>
         <p:spPr>
           <a:xfrm rot="16200000" flipH="1">
-            <a:off x="4808720" y="3546457"/>
+            <a:off x="5900920" y="3546457"/>
             <a:ext cx="153462" cy="1"/>
           </a:xfrm>
           <a:prstGeom prst="bentConnector3">
@@ -4230,7 +3965,7 @@
         </p:nvSpPr>
         <p:spPr>
           <a:xfrm>
-            <a:off x="4232620" y="4400763"/>
+            <a:off x="5261320" y="4400763"/>
             <a:ext cx="1394243" cy="276999"/>
           </a:xfrm>
           <a:prstGeom prst="rect">
@@ -4261,7 +3996,7 @@
         </p:nvSpPr>
         <p:spPr>
           <a:xfrm>
-            <a:off x="4326288" y="4812144"/>
+            <a:off x="5354988" y="4812144"/>
             <a:ext cx="1124407" cy="605245"/>
           </a:xfrm>
           <a:prstGeom prst="rect">
@@ -4301,15 +4036,7 @@
                   <a:schemeClr val="tx1"/>
                 </a:solidFill>
               </a:rPr>
-              <a:t>kilolitro </a:t>
-            </a:r>
-            <a:r>
-              <a:rPr lang="es-ES" sz="1200" dirty="0" smtClean="0">
-                <a:solidFill>
-                  <a:schemeClr val="tx1"/>
-                </a:solidFill>
-              </a:rPr>
-              <a:t>(kl)</a:t>
+              <a:t>kilolitro (kl)</a:t>
             </a:r>
             <a:endParaRPr lang="es-ES" sz="1200" baseline="30000" dirty="0" smtClean="0">
               <a:solidFill>
@@ -4325,15 +4052,7 @@
                   <a:schemeClr val="tx1"/>
                 </a:solidFill>
               </a:rPr>
-              <a:t>hectolitro </a:t>
-            </a:r>
-            <a:r>
-              <a:rPr lang="es-ES" sz="1200" dirty="0" smtClean="0">
-                <a:solidFill>
-                  <a:schemeClr val="tx1"/>
-                </a:solidFill>
-              </a:rPr>
-              <a:t>(hl)</a:t>
+              <a:t>hectolitro (hl)</a:t>
             </a:r>
             <a:endParaRPr lang="es-ES" sz="1200" baseline="30000" dirty="0" smtClean="0">
               <a:solidFill>
@@ -4349,15 +4068,7 @@
                   <a:schemeClr val="tx1"/>
                 </a:solidFill>
               </a:rPr>
-              <a:t>decalitro </a:t>
-            </a:r>
-            <a:r>
-              <a:rPr lang="es-ES" sz="1200" dirty="0" smtClean="0">
-                <a:solidFill>
-                  <a:schemeClr val="tx1"/>
-                </a:solidFill>
-              </a:rPr>
-              <a:t>(</a:t>
+              <a:t>decalitro (</a:t>
             </a:r>
             <a:r>
               <a:rPr lang="es-ES" sz="1200" dirty="0" err="1" smtClean="0">
@@ -4391,7 +4102,7 @@
         </p:nvCxnSpPr>
         <p:spPr>
           <a:xfrm rot="16200000" flipH="1">
-            <a:off x="4807723" y="5511437"/>
+            <a:off x="5912623" y="5511437"/>
             <a:ext cx="179087" cy="4"/>
           </a:xfrm>
           <a:prstGeom prst="bentConnector3">
@@ -4428,7 +4139,7 @@
         </p:nvCxnSpPr>
         <p:spPr>
           <a:xfrm rot="16200000" flipH="1">
-            <a:off x="4807719" y="4301318"/>
+            <a:off x="5899919" y="4301318"/>
             <a:ext cx="179087" cy="4"/>
           </a:xfrm>
           <a:prstGeom prst="bentConnector3">
@@ -4465,7 +4176,7 @@
         </p:nvCxnSpPr>
         <p:spPr>
           <a:xfrm rot="16200000" flipH="1">
-            <a:off x="4821112" y="4729276"/>
+            <a:off x="5913312" y="4729276"/>
             <a:ext cx="179087" cy="4"/>
           </a:xfrm>
           <a:prstGeom prst="bentConnector3">
@@ -4502,7 +4213,7 @@
         </p:nvSpPr>
         <p:spPr>
           <a:xfrm>
-            <a:off x="4205057" y="5575021"/>
+            <a:off x="5233757" y="5575021"/>
             <a:ext cx="1419061" cy="276999"/>
           </a:xfrm>
           <a:prstGeom prst="rect">
@@ -4533,7 +4244,7 @@
         </p:nvCxnSpPr>
         <p:spPr>
           <a:xfrm rot="16200000" flipH="1">
-            <a:off x="4798418" y="5901026"/>
+            <a:off x="5890618" y="5901026"/>
             <a:ext cx="179087" cy="4"/>
           </a:xfrm>
           <a:prstGeom prst="bentConnector3">
@@ -4570,7 +4281,7 @@
         </p:nvSpPr>
         <p:spPr>
           <a:xfrm>
-            <a:off x="4402700" y="5987985"/>
+            <a:off x="5431400" y="5987985"/>
             <a:ext cx="1029675" cy="605245"/>
           </a:xfrm>
           <a:prstGeom prst="rect">
@@ -4610,15 +4321,7 @@
                   <a:schemeClr val="tx1"/>
                 </a:solidFill>
               </a:rPr>
-              <a:t>decilitro </a:t>
-            </a:r>
-            <a:r>
-              <a:rPr lang="es-ES" sz="1200" dirty="0" smtClean="0">
-                <a:solidFill>
-                  <a:schemeClr val="tx1"/>
-                </a:solidFill>
-              </a:rPr>
-              <a:t>(dl)</a:t>
+              <a:t>decilitro (dl)</a:t>
             </a:r>
             <a:endParaRPr lang="es-ES" sz="1200" baseline="30000" dirty="0" smtClean="0">
               <a:solidFill>
@@ -4634,31 +4337,7 @@
                   <a:schemeClr val="tx1"/>
                 </a:solidFill>
               </a:rPr>
-              <a:t>centilitro </a:t>
-            </a:r>
-            <a:r>
-              <a:rPr lang="es-ES" sz="1200" dirty="0" smtClean="0">
-                <a:solidFill>
-                  <a:schemeClr val="tx1"/>
-                </a:solidFill>
-              </a:rPr>
-              <a:t>(cl) </a:t>
-            </a:r>
-            <a:r>
-              <a:rPr lang="es-ES" sz="1200" dirty="0" smtClean="0">
-                <a:solidFill>
-                  <a:schemeClr val="tx1"/>
-                </a:solidFill>
-              </a:rPr>
-              <a:t>mililitro </a:t>
-            </a:r>
-            <a:r>
-              <a:rPr lang="es-ES" sz="1200" dirty="0" smtClean="0">
-                <a:solidFill>
-                  <a:schemeClr val="tx1"/>
-                </a:solidFill>
-              </a:rPr>
-              <a:t>(ml)</a:t>
+              <a:t>centilitro (cl) mililitro (ml)</a:t>
             </a:r>
             <a:endParaRPr lang="es-ES" sz="1200" baseline="30000" dirty="0">
               <a:solidFill>
@@ -4676,7 +4355,7 @@
         </p:nvSpPr>
         <p:spPr>
           <a:xfrm>
-            <a:off x="5401283" y="4403429"/>
+            <a:off x="6417283" y="4403429"/>
             <a:ext cx="1419061" cy="276999"/>
           </a:xfrm>
           <a:prstGeom prst="rect">
@@ -4707,7 +4386,7 @@
         </p:nvCxnSpPr>
         <p:spPr>
           <a:xfrm rot="16200000" flipH="1">
-            <a:off x="6006851" y="4287471"/>
+            <a:off x="7086351" y="4287471"/>
             <a:ext cx="179087" cy="4"/>
           </a:xfrm>
           <a:prstGeom prst="bentConnector3">
@@ -4744,7 +4423,7 @@
         </p:nvCxnSpPr>
         <p:spPr>
           <a:xfrm rot="16200000" flipH="1">
-            <a:off x="6006847" y="4696996"/>
+            <a:off x="7073647" y="4696996"/>
             <a:ext cx="179087" cy="4"/>
           </a:xfrm>
           <a:prstGeom prst="bentConnector3">
@@ -4781,7 +4460,7 @@
         </p:nvSpPr>
         <p:spPr>
           <a:xfrm>
-            <a:off x="5511136" y="4803174"/>
+            <a:off x="6527136" y="4803174"/>
             <a:ext cx="1264806" cy="1206072"/>
           </a:xfrm>
           <a:prstGeom prst="rect">
@@ -4838,49 +4517,85 @@
                   <a:schemeClr val="tx1"/>
                 </a:solidFill>
               </a:rPr>
-              <a:t>decagramo </a:t>
-            </a:r>
+              <a:t>decagramo (</a:t>
+            </a:r>
+            <a:r>
+              <a:rPr lang="es-CO" sz="1200" dirty="0" err="1" smtClean="0">
+                <a:solidFill>
+                  <a:schemeClr val="tx1"/>
+                </a:solidFill>
+              </a:rPr>
+              <a:t>dag</a:t>
+            </a:r>
+            <a:r>
+              <a:rPr lang="es-CO" sz="1200" dirty="0">
+                <a:solidFill>
+                  <a:schemeClr val="tx1"/>
+                </a:solidFill>
+              </a:rPr>
+              <a:t>) </a:t>
+            </a:r>
+          </a:p>
+          <a:p>
             <a:r>
               <a:rPr lang="es-CO" sz="1200" dirty="0" smtClean="0">
                 <a:solidFill>
                   <a:schemeClr val="tx1"/>
                 </a:solidFill>
               </a:rPr>
+              <a:t>gramo </a:t>
+            </a:r>
+            <a:r>
+              <a:rPr lang="es-CO" sz="1200" dirty="0">
+                <a:solidFill>
+                  <a:schemeClr val="tx1"/>
+                </a:solidFill>
+              </a:rPr>
+              <a:t>(g) </a:t>
+            </a:r>
+          </a:p>
+          <a:p>
+            <a:r>
+              <a:rPr lang="es-CO" sz="1200" dirty="0" smtClean="0">
+                <a:solidFill>
+                  <a:schemeClr val="tx1"/>
+                </a:solidFill>
+              </a:rPr>
+              <a:t>decigramo </a:t>
+            </a:r>
+            <a:r>
+              <a:rPr lang="es-CO" sz="1200" dirty="0">
+                <a:solidFill>
+                  <a:schemeClr val="tx1"/>
+                </a:solidFill>
+              </a:rPr>
+              <a:t>(dg) </a:t>
+            </a:r>
+          </a:p>
+          <a:p>
+            <a:r>
+              <a:rPr lang="es-CO" sz="1200" dirty="0" smtClean="0">
+                <a:solidFill>
+                  <a:schemeClr val="tx1"/>
+                </a:solidFill>
+              </a:rPr>
+              <a:t>centigramo </a:t>
+            </a:r>
+            <a:r>
+              <a:rPr lang="es-CO" sz="1200" dirty="0">
+                <a:solidFill>
+                  <a:schemeClr val="tx1"/>
+                </a:solidFill>
+              </a:rPr>
               <a:t>(</a:t>
             </a:r>
             <a:r>
-              <a:rPr lang="es-CO" sz="1200" dirty="0" err="1" smtClean="0">
-                <a:solidFill>
-                  <a:schemeClr val="tx1"/>
-                </a:solidFill>
-              </a:rPr>
-              <a:t>dag</a:t>
-            </a:r>
-            <a:r>
-              <a:rPr lang="es-CO" sz="1200" dirty="0">
-                <a:solidFill>
-                  <a:schemeClr val="tx1"/>
-                </a:solidFill>
-              </a:rPr>
-              <a:t>) </a:t>
-            </a:r>
-          </a:p>
-          <a:p>
-            <a:r>
               <a:rPr lang="es-CO" sz="1200" dirty="0" smtClean="0">
                 <a:solidFill>
                   <a:schemeClr val="tx1"/>
                 </a:solidFill>
               </a:rPr>
-              <a:t>gramo </a:t>
-            </a:r>
-            <a:r>
-              <a:rPr lang="es-CO" sz="1200" dirty="0">
-                <a:solidFill>
-                  <a:schemeClr val="tx1"/>
-                </a:solidFill>
-              </a:rPr>
-              <a:t>(g) </a:t>
+              <a:t>cg)</a:t>
             </a:r>
           </a:p>
           <a:p>
@@ -4890,59 +4605,7 @@
                   <a:schemeClr val="tx1"/>
                 </a:solidFill>
               </a:rPr>
-              <a:t>decigramo </a:t>
-            </a:r>
-            <a:r>
-              <a:rPr lang="es-CO" sz="1200" dirty="0">
-                <a:solidFill>
-                  <a:schemeClr val="tx1"/>
-                </a:solidFill>
-              </a:rPr>
-              <a:t>(dg) </a:t>
-            </a:r>
-          </a:p>
-          <a:p>
-            <a:r>
-              <a:rPr lang="es-CO" sz="1200" dirty="0" smtClean="0">
-                <a:solidFill>
-                  <a:schemeClr val="tx1"/>
-                </a:solidFill>
-              </a:rPr>
-              <a:t>centigramo </a:t>
-            </a:r>
-            <a:r>
-              <a:rPr lang="es-CO" sz="1200" dirty="0">
-                <a:solidFill>
-                  <a:schemeClr val="tx1"/>
-                </a:solidFill>
-              </a:rPr>
-              <a:t>(</a:t>
-            </a:r>
-            <a:r>
-              <a:rPr lang="es-CO" sz="1200" dirty="0" smtClean="0">
-                <a:solidFill>
-                  <a:schemeClr val="tx1"/>
-                </a:solidFill>
-              </a:rPr>
-              <a:t>cg)</a:t>
-            </a:r>
-          </a:p>
-          <a:p>
-            <a:r>
-              <a:rPr lang="es-CO" sz="1200" dirty="0" smtClean="0">
-                <a:solidFill>
-                  <a:schemeClr val="tx1"/>
-                </a:solidFill>
-              </a:rPr>
-              <a:t>miligramo </a:t>
-            </a:r>
-            <a:r>
-              <a:rPr lang="es-CO" sz="1200" dirty="0" smtClean="0">
-                <a:solidFill>
-                  <a:schemeClr val="tx1"/>
-                </a:solidFill>
-              </a:rPr>
-              <a:t>(mg)</a:t>
+              <a:t>miligramo (mg)</a:t>
             </a:r>
             <a:endParaRPr lang="es-CO" sz="1200" dirty="0">
               <a:solidFill>
@@ -4960,7 +4623,7 @@
         </p:nvSpPr>
         <p:spPr>
           <a:xfrm>
-            <a:off x="6651189" y="4406632"/>
+            <a:off x="7641789" y="4406632"/>
             <a:ext cx="1394243" cy="276999"/>
           </a:xfrm>
           <a:prstGeom prst="rect">
@@ -4991,7 +4654,7 @@
         </p:nvCxnSpPr>
         <p:spPr>
           <a:xfrm rot="16200000" flipH="1">
-            <a:off x="7222403" y="4328123"/>
+            <a:off x="8276503" y="4328123"/>
             <a:ext cx="179087" cy="4"/>
           </a:xfrm>
           <a:prstGeom prst="bentConnector3">
@@ -5028,7 +4691,7 @@
         </p:nvCxnSpPr>
         <p:spPr>
           <a:xfrm rot="16200000" flipH="1">
-            <a:off x="7219586" y="4718252"/>
+            <a:off x="8273686" y="4718252"/>
             <a:ext cx="179087" cy="4"/>
           </a:xfrm>
           <a:prstGeom prst="bentConnector3">
@@ -5065,7 +4728,7 @@
         </p:nvSpPr>
         <p:spPr>
           <a:xfrm>
-            <a:off x="6821859" y="4820723"/>
+            <a:off x="7812459" y="4820723"/>
             <a:ext cx="1075329" cy="605245"/>
           </a:xfrm>
           <a:prstGeom prst="rect">
@@ -5105,34 +4768,18 @@
                   <a:schemeClr val="tx1"/>
                 </a:solidFill>
               </a:rPr>
-              <a:t>minuto </a:t>
-            </a:r>
+              <a:t>minuto (min)</a:t>
+            </a:r>
+          </a:p>
+          <a:p>
+            <a:pPr algn="ctr"/>
             <a:r>
               <a:rPr lang="es-ES" sz="1200" dirty="0" smtClean="0">
                 <a:solidFill>
                   <a:schemeClr val="tx1"/>
                 </a:solidFill>
               </a:rPr>
-              <a:t>(min)</a:t>
-            </a:r>
-          </a:p>
-          <a:p>
-            <a:pPr algn="ctr"/>
-            <a:r>
-              <a:rPr lang="es-ES" sz="1200" dirty="0" smtClean="0">
-                <a:solidFill>
-                  <a:schemeClr val="tx1"/>
-                </a:solidFill>
-              </a:rPr>
-              <a:t>hora </a:t>
-            </a:r>
-            <a:r>
-              <a:rPr lang="es-ES" sz="1200" dirty="0" smtClean="0">
-                <a:solidFill>
-                  <a:schemeClr val="tx1"/>
-                </a:solidFill>
-              </a:rPr>
-              <a:t>(h)</a:t>
+              <a:t>hora (h)</a:t>
             </a:r>
             <a:endParaRPr lang="es-ES" sz="1200" dirty="0">
               <a:solidFill>
@@ -5145,15 +4792,17 @@
       <p:cxnSp>
         <p:nvCxnSpPr>
           <p:cNvPr id="140" name="Conector angular 139"/>
-          <p:cNvCxnSpPr/>
+          <p:cNvCxnSpPr>
+            <a:endCxn id="49" idx="0"/>
+          </p:cNvCxnSpPr>
           <p:nvPr/>
         </p:nvCxnSpPr>
         <p:spPr>
-          <a:xfrm rot="5400000">
-            <a:off x="4101087" y="1787660"/>
-            <a:ext cx="72000" cy="1224000"/>
-          </a:xfrm>
-          <a:prstGeom prst="bentConnector3">
+          <a:xfrm rot="10800000" flipV="1">
+            <a:off x="4327473" y="2363659"/>
+            <a:ext cx="421614" cy="102949"/>
+          </a:xfrm>
+          <a:prstGeom prst="bentConnector2">
             <a:avLst/>
           </a:prstGeom>
           <a:ln w="12700">
@@ -5180,15 +4829,17 @@
       <p:cxnSp>
         <p:nvCxnSpPr>
           <p:cNvPr id="141" name="Conector angular 140"/>
-          <p:cNvCxnSpPr/>
+          <p:cNvCxnSpPr>
+            <a:endCxn id="50" idx="0"/>
+          </p:cNvCxnSpPr>
           <p:nvPr/>
         </p:nvCxnSpPr>
         <p:spPr>
-          <a:xfrm rot="16200000" flipH="1">
-            <a:off x="5411009" y="1724924"/>
-            <a:ext cx="72000" cy="1368000"/>
-          </a:xfrm>
-          <a:prstGeom prst="bentConnector3">
+          <a:xfrm>
+            <a:off x="4763009" y="2372924"/>
+            <a:ext cx="2342026" cy="93599"/>
+          </a:xfrm>
+          <a:prstGeom prst="bentConnector2">
             <a:avLst/>
           </a:prstGeom>
           <a:ln w="12700">
@@ -5212,10 +4863,278 @@
           </a:fontRef>
         </p:style>
       </p:cxnSp>
+      <p:sp>
+        <p:nvSpPr>
+          <p:cNvPr id="115" name="Rectángulo 114"/>
+          <p:cNvSpPr/>
+          <p:nvPr/>
+        </p:nvSpPr>
+        <p:spPr>
+          <a:xfrm>
+            <a:off x="1752600" y="4826240"/>
+            <a:ext cx="1828800" cy="605245"/>
+          </a:xfrm>
+          <a:prstGeom prst="rect">
+            <a:avLst/>
+          </a:prstGeom>
+          <a:solidFill>
+            <a:schemeClr val="bg1"/>
+          </a:solidFill>
+          <a:ln>
+            <a:solidFill>
+              <a:schemeClr val="tx1"/>
+            </a:solidFill>
+          </a:ln>
+        </p:spPr>
+        <p:style>
+          <a:lnRef idx="2">
+            <a:schemeClr val="accent6"/>
+          </a:lnRef>
+          <a:fillRef idx="1">
+            <a:schemeClr val="lt1"/>
+          </a:fillRef>
+          <a:effectRef idx="0">
+            <a:schemeClr val="accent6"/>
+          </a:effectRef>
+          <a:fontRef idx="minor">
+            <a:schemeClr val="dk1"/>
+          </a:fontRef>
+        </p:style>
+        <p:txBody>
+          <a:bodyPr rtlCol="0" anchor="ctr"/>
+          <a:lstStyle/>
+          <a:p>
+            <a:pPr algn="ctr"/>
+            <a:r>
+              <a:rPr lang="es-ES" sz="1400" dirty="0">
+                <a:solidFill>
+                  <a:schemeClr val="tx1"/>
+                </a:solidFill>
+              </a:rPr>
+              <a:t>k</a:t>
+            </a:r>
+            <a:r>
+              <a:rPr lang="es-ES" sz="1400" dirty="0" smtClean="0">
+                <a:solidFill>
+                  <a:schemeClr val="tx1"/>
+                </a:solidFill>
+              </a:rPr>
+              <a:t>il</a:t>
+            </a:r>
+            <a:r>
+              <a:rPr lang="es-ES" sz="1400" dirty="0" smtClean="0">
+                <a:solidFill>
+                  <a:schemeClr val="tx1"/>
+                </a:solidFill>
+              </a:rPr>
+              <a:t>ómetro cuadrado</a:t>
+            </a:r>
+            <a:endParaRPr lang="es-ES" sz="1400" baseline="30000" dirty="0" smtClean="0">
+              <a:solidFill>
+                <a:schemeClr val="tx1"/>
+              </a:solidFill>
+            </a:endParaRPr>
+          </a:p>
+          <a:p>
+            <a:pPr algn="ctr"/>
+            <a:r>
+              <a:rPr lang="es-ES" sz="1400" dirty="0">
+                <a:solidFill>
+                  <a:schemeClr val="tx1"/>
+                </a:solidFill>
+              </a:rPr>
+              <a:t>h</a:t>
+            </a:r>
+            <a:r>
+              <a:rPr lang="es-ES" sz="1400" dirty="0" smtClean="0">
+                <a:solidFill>
+                  <a:schemeClr val="tx1"/>
+                </a:solidFill>
+              </a:rPr>
+              <a:t>ect</a:t>
+            </a:r>
+            <a:r>
+              <a:rPr lang="es-ES" sz="1400" dirty="0" smtClean="0">
+                <a:solidFill>
+                  <a:schemeClr val="tx1"/>
+                </a:solidFill>
+              </a:rPr>
+              <a:t>ómetro cuadrado</a:t>
+            </a:r>
+            <a:endParaRPr lang="es-ES" sz="1400" baseline="30000" dirty="0" smtClean="0">
+              <a:solidFill>
+                <a:schemeClr val="tx1"/>
+              </a:solidFill>
+            </a:endParaRPr>
+          </a:p>
+          <a:p>
+            <a:pPr algn="ctr"/>
+            <a:r>
+              <a:rPr lang="es-ES" sz="1400" dirty="0" smtClean="0">
+                <a:solidFill>
+                  <a:schemeClr val="tx1"/>
+                </a:solidFill>
+              </a:rPr>
+              <a:t>dec</a:t>
+            </a:r>
+            <a:r>
+              <a:rPr lang="es-ES" sz="1400" dirty="0" smtClean="0">
+                <a:solidFill>
+                  <a:schemeClr val="tx1"/>
+                </a:solidFill>
+              </a:rPr>
+              <a:t>ámetro cuadrado</a:t>
+            </a:r>
+            <a:endParaRPr lang="es-ES" sz="1400" baseline="30000" dirty="0">
+              <a:solidFill>
+                <a:schemeClr val="tx1"/>
+              </a:solidFill>
+            </a:endParaRPr>
+          </a:p>
+        </p:txBody>
+      </p:sp>
+      <p:sp>
+        <p:nvSpPr>
+          <p:cNvPr id="134" name="Rectángulo 133"/>
+          <p:cNvSpPr/>
+          <p:nvPr/>
+        </p:nvSpPr>
+        <p:spPr>
+          <a:xfrm>
+            <a:off x="1765300" y="6004452"/>
+            <a:ext cx="1803400" cy="605245"/>
+          </a:xfrm>
+          <a:prstGeom prst="rect">
+            <a:avLst/>
+          </a:prstGeom>
+          <a:solidFill>
+            <a:schemeClr val="bg1"/>
+          </a:solidFill>
+          <a:ln>
+            <a:solidFill>
+              <a:schemeClr val="tx1"/>
+            </a:solidFill>
+          </a:ln>
+        </p:spPr>
+        <p:style>
+          <a:lnRef idx="2">
+            <a:schemeClr val="accent6"/>
+          </a:lnRef>
+          <a:fillRef idx="1">
+            <a:schemeClr val="lt1"/>
+          </a:fillRef>
+          <a:effectRef idx="0">
+            <a:schemeClr val="accent6"/>
+          </a:effectRef>
+          <a:fontRef idx="minor">
+            <a:schemeClr val="dk1"/>
+          </a:fontRef>
+        </p:style>
+        <p:txBody>
+          <a:bodyPr rtlCol="0" anchor="ctr"/>
+          <a:lstStyle/>
+          <a:p>
+            <a:pPr algn="ctr"/>
+            <a:r>
+              <a:rPr lang="es-ES" sz="1400" dirty="0">
+                <a:solidFill>
+                  <a:schemeClr val="tx1"/>
+                </a:solidFill>
+              </a:rPr>
+              <a:t>d</a:t>
+            </a:r>
+            <a:r>
+              <a:rPr lang="es-ES" sz="1400" dirty="0" smtClean="0">
+                <a:solidFill>
+                  <a:schemeClr val="tx1"/>
+                </a:solidFill>
+              </a:rPr>
+              <a:t>ec</a:t>
+            </a:r>
+            <a:r>
+              <a:rPr lang="es-ES" sz="1400" dirty="0" smtClean="0">
+                <a:solidFill>
+                  <a:schemeClr val="tx1"/>
+                </a:solidFill>
+              </a:rPr>
+              <a:t>ímetro cuadrado</a:t>
+            </a:r>
+            <a:endParaRPr lang="es-ES" sz="1400" baseline="30000" dirty="0" smtClean="0">
+              <a:solidFill>
+                <a:schemeClr val="tx1"/>
+              </a:solidFill>
+            </a:endParaRPr>
+          </a:p>
+          <a:p>
+            <a:pPr algn="ctr"/>
+            <a:r>
+              <a:rPr lang="es-ES" sz="1400" dirty="0">
+                <a:solidFill>
+                  <a:schemeClr val="tx1"/>
+                </a:solidFill>
+              </a:rPr>
+              <a:t>c</a:t>
+            </a:r>
+            <a:r>
+              <a:rPr lang="es-ES" sz="1400" dirty="0" smtClean="0">
+                <a:solidFill>
+                  <a:schemeClr val="tx1"/>
+                </a:solidFill>
+              </a:rPr>
+              <a:t>ent</a:t>
+            </a:r>
+            <a:r>
+              <a:rPr lang="es-ES" sz="1400" dirty="0" smtClean="0">
+                <a:solidFill>
+                  <a:schemeClr val="tx1"/>
+                </a:solidFill>
+              </a:rPr>
+              <a:t>ímetro cuadrado</a:t>
+            </a:r>
+            <a:endParaRPr lang="es-ES" sz="1400" baseline="30000" dirty="0" smtClean="0">
+              <a:solidFill>
+                <a:schemeClr val="tx1"/>
+              </a:solidFill>
+            </a:endParaRPr>
+          </a:p>
+          <a:p>
+            <a:pPr algn="ctr"/>
+            <a:r>
+              <a:rPr lang="es-ES" sz="1400" dirty="0">
+                <a:solidFill>
+                  <a:schemeClr val="tx1"/>
+                </a:solidFill>
+              </a:rPr>
+              <a:t>m</a:t>
+            </a:r>
+            <a:r>
+              <a:rPr lang="es-ES" sz="1400" dirty="0" smtClean="0">
+                <a:solidFill>
+                  <a:schemeClr val="tx1"/>
+                </a:solidFill>
+              </a:rPr>
+              <a:t>il</a:t>
+            </a:r>
+            <a:r>
+              <a:rPr lang="es-ES" sz="1400" dirty="0" smtClean="0">
+                <a:solidFill>
+                  <a:schemeClr val="tx1"/>
+                </a:solidFill>
+              </a:rPr>
+              <a:t>ímetro cuadrado</a:t>
+            </a:r>
+            <a:endParaRPr lang="es-ES" sz="1400" baseline="30000" dirty="0">
+              <a:solidFill>
+                <a:schemeClr val="tx1"/>
+              </a:solidFill>
+            </a:endParaRPr>
+          </a:p>
+        </p:txBody>
+      </p:sp>
     </p:spTree>
     <p:extLst>
       <p:ext uri="{BB962C8B-B14F-4D97-AF65-F5344CB8AC3E}">
-        <p14:creationId xmlns:p14="http://schemas.microsoft.com/office/powerpoint/2010/main" xmlns="" val="1910700679"/>
+        <p14:creationId xmlns:p14="http://schemas.microsoft.com/office/powerpoint/2010/main" val="1910700679"/>
       </p:ext>
     </p:extLst>
   </p:cSld>
@@ -5225,7 +5144,7 @@
   <p:timing>
     <p:tnLst>
       <p:par>
-        <p:cTn id="1" dur="indefinite" restart="never" nodeType="tmRoot"/>
+        <p:cTn xmlns:p14="http://schemas.microsoft.com/office/powerpoint/2010/main" id="1" dur="indefinite" restart="never" nodeType="tmRoot"/>
       </p:par>
     </p:tnLst>
   </p:timing>
@@ -5487,7 +5406,7 @@
   <a:extraClrSchemeLst/>
   <a:extLst>
     <a:ext uri="{05A4C25C-085E-4340-85A3-A5531E510DB2}">
-      <thm15:themeFamily xmlns="" xmlns:thm15="http://schemas.microsoft.com/office/thememl/2012/main" name="Office Theme" id="{62F939B6-93AF-4DB8-9C6B-D6C7DFDC589F}" vid="{4A3C46E8-61CC-4603-A589-7422A47A8E4A}"/>
+      <thm15:themeFamily xmlns:thm15="http://schemas.microsoft.com/office/thememl/2012/main" xmlns="" name="Office Theme" id="{62F939B6-93AF-4DB8-9C6B-D6C7DFDC589F}" vid="{4A3C46E8-61CC-4603-A589-7422A47A8E4A}"/>
     </a:ext>
   </a:extLst>
 </a:theme>

</xml_diff>